<commit_message>
Revert "last name spelling"
This reverts commit 549d72db5d96263def6f2ddd82e92104a61c385d.
</commit_message>
<xml_diff>
--- a/Final Project/finalProjectPresentation_LastName_FirstName.pptx
+++ b/Final Project/finalProjectPresentation_LastName_FirstName.pptx
@@ -118,7 +118,7 @@
   </p:defaultTextStyle>
   <p:extLst>
     <p:ext uri="{EFAFB233-063F-42B5-8137-9DF3F51BA10A}">
-      <p15:sldGuideLst xmlns:p15="http://schemas.microsoft.com/office/powerpoint/2012/main" xmlns=""/>
+      <p15:sldGuideLst xmlns:p15="http://schemas.microsoft.com/office/powerpoint/2012/main"/>
     </p:ext>
   </p:extLst>
 </p:presentation>
@@ -6092,25 +6092,25 @@
           <a:p>
             <a:r>
               <a:rPr lang="en-US" dirty="0" smtClean="0"/>
-              <a:t>CSUMB CST205</a:t>
-            </a:r>
-          </a:p>
-          <a:p>
+              <a:t>CSUMB </a:t>
+            </a:r>
             <a:r>
               <a:rPr lang="en-US" dirty="0" smtClean="0"/>
-              <a:t>PRESENTED BY: DANIEL HOWE, </a:t>
-            </a:r>
-            <a:r>
-              <a:rPr lang="en-US" smtClean="0"/>
-              <a:t>JIWANOT </a:t>
-            </a:r>
-            <a:r>
-              <a:rPr lang="en-US" smtClean="0"/>
-              <a:t>SANDHU</a:t>
-            </a:r>
+              <a:t>CST205</a:t>
+            </a:r>
+          </a:p>
+          <a:p>
             <a:r>
               <a:rPr lang="en-US" dirty="0" smtClean="0"/>
-              <a:t>, ROGELIO MORENO, NIKOLA PETKOV</a:t>
+              <a:t>PRESENTED </a:t>
+            </a:r>
+            <a:r>
+              <a:rPr lang="en-US" dirty="0" smtClean="0"/>
+              <a:t>BY: </a:t>
+            </a:r>
+            <a:r>
+              <a:rPr lang="en-US" dirty="0" smtClean="0"/>
+              <a:t>DANIEL HOWE, JIWANOT SIDHAU, ROGELIO MORENO, NIKOLA PETKOV</a:t>
             </a:r>
             <a:endParaRPr lang="en-US" dirty="0"/>
           </a:p>
@@ -6175,7 +6175,7 @@
   <p:timing>
     <p:tnLst>
       <p:par>
-        <p:cTn xmlns:p14="http://schemas.microsoft.com/office/powerpoint/2010/main" id="1" dur="indefinite" restart="never" nodeType="tmRoot"/>
+        <p:cTn id="1" dur="indefinite" restart="never" nodeType="tmRoot"/>
       </p:par>
     </p:tnLst>
   </p:timing>
@@ -6277,8 +6277,13 @@
           <a:p>
             <a:r>
               <a:rPr lang="en-US" dirty="0" smtClean="0"/>
-              <a:t>Image Credits:</a:t>
-            </a:r>
+              <a:t>Image Credits</a:t>
+            </a:r>
+            <a:r>
+              <a:rPr lang="en-US" dirty="0" smtClean="0"/>
+              <a:t>:</a:t>
+            </a:r>
+            <a:endParaRPr lang="en-US" dirty="0" smtClean="0"/>
           </a:p>
         </p:txBody>
       </p:sp>
@@ -6295,7 +6300,7 @@
   <p:timing>
     <p:tnLst>
       <p:par>
-        <p:cTn xmlns:p14="http://schemas.microsoft.com/office/powerpoint/2010/main" id="1" dur="indefinite" restart="never" nodeType="tmRoot"/>
+        <p:cTn id="1" dur="indefinite" restart="never" nodeType="tmRoot"/>
       </p:par>
     </p:tnLst>
   </p:timing>
@@ -6347,7 +6352,7 @@
           <p:cNvPr id="8" name="Rectangle 7">
             <a:extLst>
               <a:ext uri="{FF2B5EF4-FFF2-40B4-BE49-F238E27FC236}">
-                <a16:creationId xmlns:a16="http://schemas.microsoft.com/office/drawing/2014/main" xmlns="" id="{375136A9-49F9-4DA0-A741-F065B0FA091D}"/>
+                <a16:creationId xmlns="" xmlns:a16="http://schemas.microsoft.com/office/drawing/2014/main" id="{375136A9-49F9-4DA0-A741-F065B0FA091D}"/>
               </a:ext>
             </a:extLst>
           </p:cNvPr>
@@ -6357,7 +6362,7 @@
           <p:nvPr>
             <p:extLst>
               <p:ext uri="{386F3935-93C4-4BCD-93E2-E3B085C9AB24}">
-                <p16:designElem xmlns:p16="http://schemas.microsoft.com/office/powerpoint/2015/main" xmlns="" val="1"/>
+                <p16:designElem xmlns:p16="http://schemas.microsoft.com/office/powerpoint/2015/main" val="1"/>
               </p:ext>
             </p:extLst>
           </p:nvPr>
@@ -6414,7 +6419,7 @@
           <p:cNvPr id="10" name="Rectangle 9">
             <a:extLst>
               <a:ext uri="{FF2B5EF4-FFF2-40B4-BE49-F238E27FC236}">
-                <a16:creationId xmlns:a16="http://schemas.microsoft.com/office/drawing/2014/main" xmlns="" id="{B912F6C7-0423-4B6F-AECE-710C848918FD}"/>
+                <a16:creationId xmlns="" xmlns:a16="http://schemas.microsoft.com/office/drawing/2014/main" id="{B912F6C7-0423-4B6F-AECE-710C848918FD}"/>
               </a:ext>
             </a:extLst>
           </p:cNvPr>
@@ -6424,7 +6429,7 @@
           <p:nvPr>
             <p:extLst>
               <p:ext uri="{386F3935-93C4-4BCD-93E2-E3B085C9AB24}">
-                <p16:designElem xmlns:p16="http://schemas.microsoft.com/office/powerpoint/2015/main" xmlns="" val="1"/>
+                <p16:designElem xmlns:p16="http://schemas.microsoft.com/office/powerpoint/2015/main" val="1"/>
               </p:ext>
             </p:extLst>
           </p:nvPr>
@@ -6492,7 +6497,7 @@
           <p:cNvPr id="12" name="Straight Connector 11">
             <a:extLst>
               <a:ext uri="{FF2B5EF4-FFF2-40B4-BE49-F238E27FC236}">
-                <a16:creationId xmlns:a16="http://schemas.microsoft.com/office/drawing/2014/main" xmlns="" id="{A7208205-03EE-4EC8-9C34-59270C1880D8}"/>
+                <a16:creationId xmlns="" xmlns:a16="http://schemas.microsoft.com/office/drawing/2014/main" id="{A7208205-03EE-4EC8-9C34-59270C1880D8}"/>
               </a:ext>
             </a:extLst>
           </p:cNvPr>
@@ -6502,7 +6507,7 @@
           <p:nvPr>
             <p:extLst>
               <p:ext uri="{386F3935-93C4-4BCD-93E2-E3B085C9AB24}">
-                <p16:designElem xmlns:p16="http://schemas.microsoft.com/office/powerpoint/2015/main" xmlns="" val="1"/>
+                <p16:designElem xmlns:p16="http://schemas.microsoft.com/office/powerpoint/2015/main" val="1"/>
               </p:ext>
             </p:extLst>
           </p:nvPr>
@@ -6661,7 +6666,7 @@
   <p:timing>
     <p:tnLst>
       <p:par>
-        <p:cTn xmlns:p14="http://schemas.microsoft.com/office/powerpoint/2010/main" id="1" dur="indefinite" restart="never" nodeType="tmRoot"/>
+        <p:cTn id="1" dur="indefinite" restart="never" nodeType="tmRoot"/>
       </p:par>
     </p:tnLst>
   </p:timing>
@@ -6848,7 +6853,7 @@
           <p:cNvPr id="8" name="Rectangle 7">
             <a:extLst>
               <a:ext uri="{FF2B5EF4-FFF2-40B4-BE49-F238E27FC236}">
-                <a16:creationId xmlns:a16="http://schemas.microsoft.com/office/drawing/2014/main" xmlns="" id="{375136A9-49F9-4DA0-A741-F065B0FA091D}"/>
+                <a16:creationId xmlns="" xmlns:a16="http://schemas.microsoft.com/office/drawing/2014/main" id="{375136A9-49F9-4DA0-A741-F065B0FA091D}"/>
               </a:ext>
             </a:extLst>
           </p:cNvPr>
@@ -6858,7 +6863,7 @@
           <p:nvPr>
             <p:extLst>
               <p:ext uri="{386F3935-93C4-4BCD-93E2-E3B085C9AB24}">
-                <p16:designElem xmlns:p16="http://schemas.microsoft.com/office/powerpoint/2015/main" xmlns="" val="1"/>
+                <p16:designElem xmlns:p16="http://schemas.microsoft.com/office/powerpoint/2015/main" val="1"/>
               </p:ext>
             </p:extLst>
           </p:nvPr>
@@ -6915,7 +6920,7 @@
           <p:cNvPr id="10" name="Rectangle 9">
             <a:extLst>
               <a:ext uri="{FF2B5EF4-FFF2-40B4-BE49-F238E27FC236}">
-                <a16:creationId xmlns:a16="http://schemas.microsoft.com/office/drawing/2014/main" xmlns="" id="{B912F6C7-0423-4B6F-AECE-710C848918FD}"/>
+                <a16:creationId xmlns="" xmlns:a16="http://schemas.microsoft.com/office/drawing/2014/main" id="{B912F6C7-0423-4B6F-AECE-710C848918FD}"/>
               </a:ext>
             </a:extLst>
           </p:cNvPr>
@@ -6925,7 +6930,7 @@
           <p:nvPr>
             <p:extLst>
               <p:ext uri="{386F3935-93C4-4BCD-93E2-E3B085C9AB24}">
-                <p16:designElem xmlns:p16="http://schemas.microsoft.com/office/powerpoint/2015/main" xmlns="" val="1"/>
+                <p16:designElem xmlns:p16="http://schemas.microsoft.com/office/powerpoint/2015/main" val="1"/>
               </p:ext>
             </p:extLst>
           </p:nvPr>
@@ -6993,7 +6998,7 @@
           <p:cNvPr id="12" name="Straight Connector 11">
             <a:extLst>
               <a:ext uri="{FF2B5EF4-FFF2-40B4-BE49-F238E27FC236}">
-                <a16:creationId xmlns:a16="http://schemas.microsoft.com/office/drawing/2014/main" xmlns="" id="{A7208205-03EE-4EC8-9C34-59270C1880D8}"/>
+                <a16:creationId xmlns="" xmlns:a16="http://schemas.microsoft.com/office/drawing/2014/main" id="{A7208205-03EE-4EC8-9C34-59270C1880D8}"/>
               </a:ext>
             </a:extLst>
           </p:cNvPr>
@@ -7003,7 +7008,7 @@
           <p:nvPr>
             <p:extLst>
               <p:ext uri="{386F3935-93C4-4BCD-93E2-E3B085C9AB24}">
-                <p16:designElem xmlns:p16="http://schemas.microsoft.com/office/powerpoint/2015/main" xmlns="" val="1"/>
+                <p16:designElem xmlns:p16="http://schemas.microsoft.com/office/powerpoint/2015/main" val="1"/>
               </p:ext>
             </p:extLst>
           </p:nvPr>
@@ -7218,7 +7223,7 @@
   <p:timing>
     <p:tnLst>
       <p:par>
-        <p:cTn xmlns:p14="http://schemas.microsoft.com/office/powerpoint/2010/main" id="1" dur="indefinite" restart="never" nodeType="tmRoot"/>
+        <p:cTn id="1" dur="indefinite" restart="never" nodeType="tmRoot"/>
       </p:par>
     </p:tnLst>
   </p:timing>
@@ -7270,7 +7275,7 @@
           <p:cNvPr id="8" name="Rounded Rectangle 9">
             <a:extLst>
               <a:ext uri="{FF2B5EF4-FFF2-40B4-BE49-F238E27FC236}">
-                <a16:creationId xmlns:a16="http://schemas.microsoft.com/office/drawing/2014/main" xmlns="" id="{BCA2EB72-13DC-4DC6-B461-3B036C55B925}"/>
+                <a16:creationId xmlns="" xmlns:a16="http://schemas.microsoft.com/office/drawing/2014/main" id="{BCA2EB72-13DC-4DC6-B461-3B036C55B925}"/>
               </a:ext>
             </a:extLst>
           </p:cNvPr>
@@ -7280,7 +7285,7 @@
           <p:nvPr>
             <p:extLst>
               <p:ext uri="{386F3935-93C4-4BCD-93E2-E3B085C9AB24}">
-                <p16:designElem xmlns:p16="http://schemas.microsoft.com/office/powerpoint/2015/main" xmlns="" val="1"/>
+                <p16:designElem xmlns:p16="http://schemas.microsoft.com/office/powerpoint/2015/main" val="1"/>
               </p:ext>
             </p:extLst>
           </p:nvPr>
@@ -7356,7 +7361,7 @@
           <p:cNvPr id="10" name="Straight Connector 9">
             <a:extLst>
               <a:ext uri="{FF2B5EF4-FFF2-40B4-BE49-F238E27FC236}">
-                <a16:creationId xmlns:a16="http://schemas.microsoft.com/office/drawing/2014/main" xmlns="" id="{C8F75BF3-096E-451E-A222-96A7F0946814}"/>
+                <a16:creationId xmlns="" xmlns:a16="http://schemas.microsoft.com/office/drawing/2014/main" id="{C8F75BF3-096E-451E-A222-96A7F0946814}"/>
               </a:ext>
             </a:extLst>
           </p:cNvPr>
@@ -7366,7 +7371,7 @@
           <p:nvPr>
             <p:extLst>
               <p:ext uri="{386F3935-93C4-4BCD-93E2-E3B085C9AB24}">
-                <p16:designElem xmlns:p16="http://schemas.microsoft.com/office/powerpoint/2015/main" xmlns="" val="1"/>
+                <p16:designElem xmlns:p16="http://schemas.microsoft.com/office/powerpoint/2015/main" val="1"/>
               </p:ext>
             </p:extLst>
           </p:nvPr>
@@ -7454,7 +7459,7 @@
   <p:timing>
     <p:tnLst>
       <p:par>
-        <p:cTn xmlns:p14="http://schemas.microsoft.com/office/powerpoint/2010/main" id="1" dur="indefinite" restart="never" nodeType="tmRoot"/>
+        <p:cTn id="1" dur="indefinite" restart="never" nodeType="tmRoot"/>
       </p:par>
     </p:tnLst>
   </p:timing>
@@ -7506,7 +7511,7 @@
           <p:cNvPr id="8" name="Rectangle 7">
             <a:extLst>
               <a:ext uri="{FF2B5EF4-FFF2-40B4-BE49-F238E27FC236}">
-                <a16:creationId xmlns:a16="http://schemas.microsoft.com/office/drawing/2014/main" xmlns="" id="{375136A9-49F9-4DA0-A741-F065B0FA091D}"/>
+                <a16:creationId xmlns="" xmlns:a16="http://schemas.microsoft.com/office/drawing/2014/main" id="{375136A9-49F9-4DA0-A741-F065B0FA091D}"/>
               </a:ext>
             </a:extLst>
           </p:cNvPr>
@@ -7516,7 +7521,7 @@
           <p:nvPr>
             <p:extLst>
               <p:ext uri="{386F3935-93C4-4BCD-93E2-E3B085C9AB24}">
-                <p16:designElem xmlns:p16="http://schemas.microsoft.com/office/powerpoint/2015/main" xmlns="" val="1"/>
+                <p16:designElem xmlns:p16="http://schemas.microsoft.com/office/powerpoint/2015/main" val="1"/>
               </p:ext>
             </p:extLst>
           </p:nvPr>
@@ -7573,7 +7578,7 @@
           <p:cNvPr id="10" name="Rectangle 9">
             <a:extLst>
               <a:ext uri="{FF2B5EF4-FFF2-40B4-BE49-F238E27FC236}">
-                <a16:creationId xmlns:a16="http://schemas.microsoft.com/office/drawing/2014/main" xmlns="" id="{B912F6C7-0423-4B6F-AECE-710C848918FD}"/>
+                <a16:creationId xmlns="" xmlns:a16="http://schemas.microsoft.com/office/drawing/2014/main" id="{B912F6C7-0423-4B6F-AECE-710C848918FD}"/>
               </a:ext>
             </a:extLst>
           </p:cNvPr>
@@ -7583,7 +7588,7 @@
           <p:nvPr>
             <p:extLst>
               <p:ext uri="{386F3935-93C4-4BCD-93E2-E3B085C9AB24}">
-                <p16:designElem xmlns:p16="http://schemas.microsoft.com/office/powerpoint/2015/main" xmlns="" val="1"/>
+                <p16:designElem xmlns:p16="http://schemas.microsoft.com/office/powerpoint/2015/main" val="1"/>
               </p:ext>
             </p:extLst>
           </p:nvPr>
@@ -7651,7 +7656,7 @@
           <p:cNvPr id="12" name="Straight Connector 11">
             <a:extLst>
               <a:ext uri="{FF2B5EF4-FFF2-40B4-BE49-F238E27FC236}">
-                <a16:creationId xmlns:a16="http://schemas.microsoft.com/office/drawing/2014/main" xmlns="" id="{A7208205-03EE-4EC8-9C34-59270C1880D8}"/>
+                <a16:creationId xmlns="" xmlns:a16="http://schemas.microsoft.com/office/drawing/2014/main" id="{A7208205-03EE-4EC8-9C34-59270C1880D8}"/>
               </a:ext>
             </a:extLst>
           </p:cNvPr>
@@ -7661,7 +7666,7 @@
           <p:nvPr>
             <p:extLst>
               <p:ext uri="{386F3935-93C4-4BCD-93E2-E3B085C9AB24}">
-                <p16:designElem xmlns:p16="http://schemas.microsoft.com/office/powerpoint/2015/main" xmlns="" val="1"/>
+                <p16:designElem xmlns:p16="http://schemas.microsoft.com/office/powerpoint/2015/main" val="1"/>
               </p:ext>
             </p:extLst>
           </p:nvPr>
@@ -7830,7 +7835,7 @@
   <p:timing>
     <p:tnLst>
       <p:par>
-        <p:cTn xmlns:p14="http://schemas.microsoft.com/office/powerpoint/2010/main" id="1" dur="indefinite" restart="never" nodeType="tmRoot"/>
+        <p:cTn id="1" dur="indefinite" restart="never" nodeType="tmRoot"/>
       </p:par>
     </p:tnLst>
   </p:timing>
@@ -7882,7 +7887,7 @@
           <p:cNvPr id="8" name="Rounded Rectangle 9">
             <a:extLst>
               <a:ext uri="{FF2B5EF4-FFF2-40B4-BE49-F238E27FC236}">
-                <a16:creationId xmlns:a16="http://schemas.microsoft.com/office/drawing/2014/main" xmlns="" id="{BCA2EB72-13DC-4DC6-B461-3B036C55B925}"/>
+                <a16:creationId xmlns="" xmlns:a16="http://schemas.microsoft.com/office/drawing/2014/main" id="{BCA2EB72-13DC-4DC6-B461-3B036C55B925}"/>
               </a:ext>
             </a:extLst>
           </p:cNvPr>
@@ -7892,7 +7897,7 @@
           <p:nvPr>
             <p:extLst>
               <p:ext uri="{386F3935-93C4-4BCD-93E2-E3B085C9AB24}">
-                <p16:designElem xmlns:p16="http://schemas.microsoft.com/office/powerpoint/2015/main" xmlns="" val="1"/>
+                <p16:designElem xmlns:p16="http://schemas.microsoft.com/office/powerpoint/2015/main" val="1"/>
               </p:ext>
             </p:extLst>
           </p:nvPr>
@@ -7968,7 +7973,7 @@
           <p:cNvPr id="10" name="Straight Connector 9">
             <a:extLst>
               <a:ext uri="{FF2B5EF4-FFF2-40B4-BE49-F238E27FC236}">
-                <a16:creationId xmlns:a16="http://schemas.microsoft.com/office/drawing/2014/main" xmlns="" id="{C8F75BF3-096E-451E-A222-96A7F0946814}"/>
+                <a16:creationId xmlns="" xmlns:a16="http://schemas.microsoft.com/office/drawing/2014/main" id="{C8F75BF3-096E-451E-A222-96A7F0946814}"/>
               </a:ext>
             </a:extLst>
           </p:cNvPr>
@@ -7978,7 +7983,7 @@
           <p:nvPr>
             <p:extLst>
               <p:ext uri="{386F3935-93C4-4BCD-93E2-E3B085C9AB24}">
-                <p16:designElem xmlns:p16="http://schemas.microsoft.com/office/powerpoint/2015/main" xmlns="" val="1"/>
+                <p16:designElem xmlns:p16="http://schemas.microsoft.com/office/powerpoint/2015/main" val="1"/>
               </p:ext>
             </p:extLst>
           </p:nvPr>
@@ -8066,7 +8071,7 @@
   <p:timing>
     <p:tnLst>
       <p:par>
-        <p:cTn xmlns:p14="http://schemas.microsoft.com/office/powerpoint/2010/main" id="1" dur="indefinite" restart="never" nodeType="tmRoot"/>
+        <p:cTn id="1" dur="indefinite" restart="never" nodeType="tmRoot"/>
       </p:par>
     </p:tnLst>
   </p:timing>
@@ -8118,7 +8123,7 @@
           <p:cNvPr id="8" name="Rectangle 7">
             <a:extLst>
               <a:ext uri="{FF2B5EF4-FFF2-40B4-BE49-F238E27FC236}">
-                <a16:creationId xmlns:a16="http://schemas.microsoft.com/office/drawing/2014/main" xmlns="" id="{375136A9-49F9-4DA0-A741-F065B0FA091D}"/>
+                <a16:creationId xmlns="" xmlns:a16="http://schemas.microsoft.com/office/drawing/2014/main" id="{375136A9-49F9-4DA0-A741-F065B0FA091D}"/>
               </a:ext>
             </a:extLst>
           </p:cNvPr>
@@ -8128,7 +8133,7 @@
           <p:nvPr>
             <p:extLst>
               <p:ext uri="{386F3935-93C4-4BCD-93E2-E3B085C9AB24}">
-                <p16:designElem xmlns:p16="http://schemas.microsoft.com/office/powerpoint/2015/main" xmlns="" val="1"/>
+                <p16:designElem xmlns:p16="http://schemas.microsoft.com/office/powerpoint/2015/main" val="1"/>
               </p:ext>
             </p:extLst>
           </p:nvPr>
@@ -8185,7 +8190,7 @@
           <p:cNvPr id="10" name="Rectangle 9">
             <a:extLst>
               <a:ext uri="{FF2B5EF4-FFF2-40B4-BE49-F238E27FC236}">
-                <a16:creationId xmlns:a16="http://schemas.microsoft.com/office/drawing/2014/main" xmlns="" id="{B912F6C7-0423-4B6F-AECE-710C848918FD}"/>
+                <a16:creationId xmlns="" xmlns:a16="http://schemas.microsoft.com/office/drawing/2014/main" id="{B912F6C7-0423-4B6F-AECE-710C848918FD}"/>
               </a:ext>
             </a:extLst>
           </p:cNvPr>
@@ -8195,7 +8200,7 @@
           <p:nvPr>
             <p:extLst>
               <p:ext uri="{386F3935-93C4-4BCD-93E2-E3B085C9AB24}">
-                <p16:designElem xmlns:p16="http://schemas.microsoft.com/office/powerpoint/2015/main" xmlns="" val="1"/>
+                <p16:designElem xmlns:p16="http://schemas.microsoft.com/office/powerpoint/2015/main" val="1"/>
               </p:ext>
             </p:extLst>
           </p:nvPr>
@@ -8263,7 +8268,7 @@
           <p:cNvPr id="12" name="Straight Connector 11">
             <a:extLst>
               <a:ext uri="{FF2B5EF4-FFF2-40B4-BE49-F238E27FC236}">
-                <a16:creationId xmlns:a16="http://schemas.microsoft.com/office/drawing/2014/main" xmlns="" id="{A7208205-03EE-4EC8-9C34-59270C1880D8}"/>
+                <a16:creationId xmlns="" xmlns:a16="http://schemas.microsoft.com/office/drawing/2014/main" id="{A7208205-03EE-4EC8-9C34-59270C1880D8}"/>
               </a:ext>
             </a:extLst>
           </p:cNvPr>
@@ -8273,7 +8278,7 @@
           <p:nvPr>
             <p:extLst>
               <p:ext uri="{386F3935-93C4-4BCD-93E2-E3B085C9AB24}">
-                <p16:designElem xmlns:p16="http://schemas.microsoft.com/office/powerpoint/2015/main" xmlns="" val="1"/>
+                <p16:designElem xmlns:p16="http://schemas.microsoft.com/office/powerpoint/2015/main" val="1"/>
               </p:ext>
             </p:extLst>
           </p:nvPr>
@@ -8505,7 +8510,7 @@
   <p:timing>
     <p:tnLst>
       <p:par>
-        <p:cTn xmlns:p14="http://schemas.microsoft.com/office/powerpoint/2010/main" id="1" dur="indefinite" restart="never" nodeType="tmRoot"/>
+        <p:cTn id="1" dur="indefinite" restart="never" nodeType="tmRoot"/>
       </p:par>
     </p:tnLst>
   </p:timing>
@@ -8557,7 +8562,7 @@
           <p:cNvPr id="8" name="Rounded Rectangle 9">
             <a:extLst>
               <a:ext uri="{FF2B5EF4-FFF2-40B4-BE49-F238E27FC236}">
-                <a16:creationId xmlns:a16="http://schemas.microsoft.com/office/drawing/2014/main" xmlns="" id="{BCA2EB72-13DC-4DC6-B461-3B036C55B925}"/>
+                <a16:creationId xmlns="" xmlns:a16="http://schemas.microsoft.com/office/drawing/2014/main" id="{BCA2EB72-13DC-4DC6-B461-3B036C55B925}"/>
               </a:ext>
             </a:extLst>
           </p:cNvPr>
@@ -8567,7 +8572,7 @@
           <p:nvPr>
             <p:extLst>
               <p:ext uri="{386F3935-93C4-4BCD-93E2-E3B085C9AB24}">
-                <p16:designElem xmlns:p16="http://schemas.microsoft.com/office/powerpoint/2015/main" xmlns="" val="1"/>
+                <p16:designElem xmlns:p16="http://schemas.microsoft.com/office/powerpoint/2015/main" val="1"/>
               </p:ext>
             </p:extLst>
           </p:nvPr>
@@ -8643,7 +8648,7 @@
           <p:cNvPr id="10" name="Straight Connector 9">
             <a:extLst>
               <a:ext uri="{FF2B5EF4-FFF2-40B4-BE49-F238E27FC236}">
-                <a16:creationId xmlns:a16="http://schemas.microsoft.com/office/drawing/2014/main" xmlns="" id="{C8F75BF3-096E-451E-A222-96A7F0946814}"/>
+                <a16:creationId xmlns="" xmlns:a16="http://schemas.microsoft.com/office/drawing/2014/main" id="{C8F75BF3-096E-451E-A222-96A7F0946814}"/>
               </a:ext>
             </a:extLst>
           </p:cNvPr>
@@ -8653,7 +8658,7 @@
           <p:nvPr>
             <p:extLst>
               <p:ext uri="{386F3935-93C4-4BCD-93E2-E3B085C9AB24}">
-                <p16:designElem xmlns:p16="http://schemas.microsoft.com/office/powerpoint/2015/main" xmlns="" val="1"/>
+                <p16:designElem xmlns:p16="http://schemas.microsoft.com/office/powerpoint/2015/main" val="1"/>
               </p:ext>
             </p:extLst>
           </p:nvPr>
@@ -8741,7 +8746,7 @@
   <p:timing>
     <p:tnLst>
       <p:par>
-        <p:cTn xmlns:p14="http://schemas.microsoft.com/office/powerpoint/2010/main" id="1" dur="indefinite" restart="never" nodeType="tmRoot"/>
+        <p:cTn id="1" dur="indefinite" restart="never" nodeType="tmRoot"/>
       </p:par>
     </p:tnLst>
   </p:timing>
@@ -8791,7 +8796,7 @@
     </a:clrScheme>
     <a:fontScheme name="Mesh">
       <a:majorFont>
-        <a:latin typeface="Century Gothic"/>
+        <a:latin typeface="Century Gothic" panose="020B0502020202020204"/>
         <a:ea typeface=""/>
         <a:cs typeface=""/>
         <a:font script="Jpan" typeface="ＭＳ ゴシック"/>
@@ -8826,7 +8831,7 @@
         <a:font script="Geor" typeface="Sylfaen"/>
       </a:majorFont>
       <a:minorFont>
-        <a:latin typeface="Century Gothic"/>
+        <a:latin typeface="Century Gothic" panose="020B0502020202020204"/>
         <a:ea typeface=""/>
         <a:cs typeface=""/>
         <a:font script="Jpan" typeface="ＭＳ ゴシック"/>
@@ -8998,7 +9003,7 @@
   <a:extraClrSchemeLst/>
   <a:extLst>
     <a:ext uri="{05A4C25C-085E-4340-85A3-A5531E510DB2}">
-      <thm15:themeFamily xmlns:thm15="http://schemas.microsoft.com/office/thememl/2012/main" xmlns="" name="Mesh" id="{789EC3FE-34FD-429C-9918-760025E6C145}" vid="{B8BE45C0-8141-4D58-8C71-A009BC26FBBB}"/>
+      <thm15:themeFamily xmlns:thm15="http://schemas.microsoft.com/office/thememl/2012/main" name="Mesh" id="{789EC3FE-34FD-429C-9918-760025E6C145}" vid="{B8BE45C0-8141-4D58-8C71-A009BC26FBBB}"/>
     </a:ext>
   </a:extLst>
 </a:theme>
@@ -9047,7 +9052,7 @@
     </a:clrScheme>
     <a:fontScheme name="Office">
       <a:majorFont>
-        <a:latin typeface="Calibri Light"/>
+        <a:latin typeface="Calibri Light" panose="020F0302020204030204"/>
         <a:ea typeface=""/>
         <a:cs typeface=""/>
         <a:font script="Jpan" typeface="Yu Gothic Light"/>
@@ -9082,7 +9087,7 @@
         <a:font script="Geor" typeface="Sylfaen"/>
       </a:majorFont>
       <a:minorFont>
-        <a:latin typeface="Calibri"/>
+        <a:latin typeface="Calibri" panose="020F0502020204030204"/>
         <a:ea typeface=""/>
         <a:cs typeface=""/>
         <a:font script="Jpan" typeface="Yu Gothic"/>
@@ -9259,7 +9264,7 @@
   <a:extraClrSchemeLst/>
   <a:extLst>
     <a:ext uri="{05A4C25C-085E-4340-85A3-A5531E510DB2}">
-      <thm15:themeFamily xmlns:thm15="http://schemas.microsoft.com/office/thememl/2012/main" xmlns="" name="Office Theme" id="{62F939B6-93AF-4DB8-9C6B-D6C7DFDC589F}" vid="{4A3C46E8-61CC-4603-A589-7422A47A8E4A}"/>
+      <thm15:themeFamily xmlns:thm15="http://schemas.microsoft.com/office/thememl/2012/main" name="Office Theme" id="{62F939B6-93AF-4DB8-9C6B-D6C7DFDC589F}" vid="{4A3C46E8-61CC-4603-A589-7422A47A8E4A}"/>
     </a:ext>
   </a:extLst>
 </a:theme>

</xml_diff>

<commit_message>
Revert "Revert "last name spelling""
This reverts commit 29868f0c02adac0b90c053e02bad3a11668d6f34.
</commit_message>
<xml_diff>
--- a/Final Project/finalProjectPresentation_LastName_FirstName.pptx
+++ b/Final Project/finalProjectPresentation_LastName_FirstName.pptx
@@ -118,7 +118,7 @@
   </p:defaultTextStyle>
   <p:extLst>
     <p:ext uri="{EFAFB233-063F-42B5-8137-9DF3F51BA10A}">
-      <p15:sldGuideLst xmlns:p15="http://schemas.microsoft.com/office/powerpoint/2012/main"/>
+      <p15:sldGuideLst xmlns:p15="http://schemas.microsoft.com/office/powerpoint/2012/main" xmlns=""/>
     </p:ext>
   </p:extLst>
 </p:presentation>
@@ -6092,25 +6092,25 @@
           <a:p>
             <a:r>
               <a:rPr lang="en-US" dirty="0" smtClean="0"/>
-              <a:t>CSUMB </a:t>
-            </a:r>
+              <a:t>CSUMB CST205</a:t>
+            </a:r>
+          </a:p>
+          <a:p>
             <a:r>
               <a:rPr lang="en-US" dirty="0" smtClean="0"/>
-              <a:t>CST205</a:t>
-            </a:r>
-          </a:p>
-          <a:p>
+              <a:t>PRESENTED BY: DANIEL HOWE, </a:t>
+            </a:r>
+            <a:r>
+              <a:rPr lang="en-US" smtClean="0"/>
+              <a:t>JIWANOT </a:t>
+            </a:r>
+            <a:r>
+              <a:rPr lang="en-US" smtClean="0"/>
+              <a:t>SANDHU</a:t>
+            </a:r>
             <a:r>
               <a:rPr lang="en-US" dirty="0" smtClean="0"/>
-              <a:t>PRESENTED </a:t>
-            </a:r>
-            <a:r>
-              <a:rPr lang="en-US" dirty="0" smtClean="0"/>
-              <a:t>BY: </a:t>
-            </a:r>
-            <a:r>
-              <a:rPr lang="en-US" dirty="0" smtClean="0"/>
-              <a:t>DANIEL HOWE, JIWANOT SIDHAU, ROGELIO MORENO, NIKOLA PETKOV</a:t>
+              <a:t>, ROGELIO MORENO, NIKOLA PETKOV</a:t>
             </a:r>
             <a:endParaRPr lang="en-US" dirty="0"/>
           </a:p>
@@ -6175,7 +6175,7 @@
   <p:timing>
     <p:tnLst>
       <p:par>
-        <p:cTn id="1" dur="indefinite" restart="never" nodeType="tmRoot"/>
+        <p:cTn xmlns:p14="http://schemas.microsoft.com/office/powerpoint/2010/main" id="1" dur="indefinite" restart="never" nodeType="tmRoot"/>
       </p:par>
     </p:tnLst>
   </p:timing>
@@ -6277,13 +6277,8 @@
           <a:p>
             <a:r>
               <a:rPr lang="en-US" dirty="0" smtClean="0"/>
-              <a:t>Image Credits</a:t>
-            </a:r>
-            <a:r>
-              <a:rPr lang="en-US" dirty="0" smtClean="0"/>
-              <a:t>:</a:t>
-            </a:r>
-            <a:endParaRPr lang="en-US" dirty="0" smtClean="0"/>
+              <a:t>Image Credits:</a:t>
+            </a:r>
           </a:p>
         </p:txBody>
       </p:sp>
@@ -6300,7 +6295,7 @@
   <p:timing>
     <p:tnLst>
       <p:par>
-        <p:cTn id="1" dur="indefinite" restart="never" nodeType="tmRoot"/>
+        <p:cTn xmlns:p14="http://schemas.microsoft.com/office/powerpoint/2010/main" id="1" dur="indefinite" restart="never" nodeType="tmRoot"/>
       </p:par>
     </p:tnLst>
   </p:timing>
@@ -6352,7 +6347,7 @@
           <p:cNvPr id="8" name="Rectangle 7">
             <a:extLst>
               <a:ext uri="{FF2B5EF4-FFF2-40B4-BE49-F238E27FC236}">
-                <a16:creationId xmlns="" xmlns:a16="http://schemas.microsoft.com/office/drawing/2014/main" id="{375136A9-49F9-4DA0-A741-F065B0FA091D}"/>
+                <a16:creationId xmlns:a16="http://schemas.microsoft.com/office/drawing/2014/main" xmlns="" id="{375136A9-49F9-4DA0-A741-F065B0FA091D}"/>
               </a:ext>
             </a:extLst>
           </p:cNvPr>
@@ -6362,7 +6357,7 @@
           <p:nvPr>
             <p:extLst>
               <p:ext uri="{386F3935-93C4-4BCD-93E2-E3B085C9AB24}">
-                <p16:designElem xmlns:p16="http://schemas.microsoft.com/office/powerpoint/2015/main" val="1"/>
+                <p16:designElem xmlns:p16="http://schemas.microsoft.com/office/powerpoint/2015/main" xmlns="" val="1"/>
               </p:ext>
             </p:extLst>
           </p:nvPr>
@@ -6419,7 +6414,7 @@
           <p:cNvPr id="10" name="Rectangle 9">
             <a:extLst>
               <a:ext uri="{FF2B5EF4-FFF2-40B4-BE49-F238E27FC236}">
-                <a16:creationId xmlns="" xmlns:a16="http://schemas.microsoft.com/office/drawing/2014/main" id="{B912F6C7-0423-4B6F-AECE-710C848918FD}"/>
+                <a16:creationId xmlns:a16="http://schemas.microsoft.com/office/drawing/2014/main" xmlns="" id="{B912F6C7-0423-4B6F-AECE-710C848918FD}"/>
               </a:ext>
             </a:extLst>
           </p:cNvPr>
@@ -6429,7 +6424,7 @@
           <p:nvPr>
             <p:extLst>
               <p:ext uri="{386F3935-93C4-4BCD-93E2-E3B085C9AB24}">
-                <p16:designElem xmlns:p16="http://schemas.microsoft.com/office/powerpoint/2015/main" val="1"/>
+                <p16:designElem xmlns:p16="http://schemas.microsoft.com/office/powerpoint/2015/main" xmlns="" val="1"/>
               </p:ext>
             </p:extLst>
           </p:nvPr>
@@ -6497,7 +6492,7 @@
           <p:cNvPr id="12" name="Straight Connector 11">
             <a:extLst>
               <a:ext uri="{FF2B5EF4-FFF2-40B4-BE49-F238E27FC236}">
-                <a16:creationId xmlns="" xmlns:a16="http://schemas.microsoft.com/office/drawing/2014/main" id="{A7208205-03EE-4EC8-9C34-59270C1880D8}"/>
+                <a16:creationId xmlns:a16="http://schemas.microsoft.com/office/drawing/2014/main" xmlns="" id="{A7208205-03EE-4EC8-9C34-59270C1880D8}"/>
               </a:ext>
             </a:extLst>
           </p:cNvPr>
@@ -6507,7 +6502,7 @@
           <p:nvPr>
             <p:extLst>
               <p:ext uri="{386F3935-93C4-4BCD-93E2-E3B085C9AB24}">
-                <p16:designElem xmlns:p16="http://schemas.microsoft.com/office/powerpoint/2015/main" val="1"/>
+                <p16:designElem xmlns:p16="http://schemas.microsoft.com/office/powerpoint/2015/main" xmlns="" val="1"/>
               </p:ext>
             </p:extLst>
           </p:nvPr>
@@ -6666,7 +6661,7 @@
   <p:timing>
     <p:tnLst>
       <p:par>
-        <p:cTn id="1" dur="indefinite" restart="never" nodeType="tmRoot"/>
+        <p:cTn xmlns:p14="http://schemas.microsoft.com/office/powerpoint/2010/main" id="1" dur="indefinite" restart="never" nodeType="tmRoot"/>
       </p:par>
     </p:tnLst>
   </p:timing>
@@ -6853,7 +6848,7 @@
           <p:cNvPr id="8" name="Rectangle 7">
             <a:extLst>
               <a:ext uri="{FF2B5EF4-FFF2-40B4-BE49-F238E27FC236}">
-                <a16:creationId xmlns="" xmlns:a16="http://schemas.microsoft.com/office/drawing/2014/main" id="{375136A9-49F9-4DA0-A741-F065B0FA091D}"/>
+                <a16:creationId xmlns:a16="http://schemas.microsoft.com/office/drawing/2014/main" xmlns="" id="{375136A9-49F9-4DA0-A741-F065B0FA091D}"/>
               </a:ext>
             </a:extLst>
           </p:cNvPr>
@@ -6863,7 +6858,7 @@
           <p:nvPr>
             <p:extLst>
               <p:ext uri="{386F3935-93C4-4BCD-93E2-E3B085C9AB24}">
-                <p16:designElem xmlns:p16="http://schemas.microsoft.com/office/powerpoint/2015/main" val="1"/>
+                <p16:designElem xmlns:p16="http://schemas.microsoft.com/office/powerpoint/2015/main" xmlns="" val="1"/>
               </p:ext>
             </p:extLst>
           </p:nvPr>
@@ -6920,7 +6915,7 @@
           <p:cNvPr id="10" name="Rectangle 9">
             <a:extLst>
               <a:ext uri="{FF2B5EF4-FFF2-40B4-BE49-F238E27FC236}">
-                <a16:creationId xmlns="" xmlns:a16="http://schemas.microsoft.com/office/drawing/2014/main" id="{B912F6C7-0423-4B6F-AECE-710C848918FD}"/>
+                <a16:creationId xmlns:a16="http://schemas.microsoft.com/office/drawing/2014/main" xmlns="" id="{B912F6C7-0423-4B6F-AECE-710C848918FD}"/>
               </a:ext>
             </a:extLst>
           </p:cNvPr>
@@ -6930,7 +6925,7 @@
           <p:nvPr>
             <p:extLst>
               <p:ext uri="{386F3935-93C4-4BCD-93E2-E3B085C9AB24}">
-                <p16:designElem xmlns:p16="http://schemas.microsoft.com/office/powerpoint/2015/main" val="1"/>
+                <p16:designElem xmlns:p16="http://schemas.microsoft.com/office/powerpoint/2015/main" xmlns="" val="1"/>
               </p:ext>
             </p:extLst>
           </p:nvPr>
@@ -6998,7 +6993,7 @@
           <p:cNvPr id="12" name="Straight Connector 11">
             <a:extLst>
               <a:ext uri="{FF2B5EF4-FFF2-40B4-BE49-F238E27FC236}">
-                <a16:creationId xmlns="" xmlns:a16="http://schemas.microsoft.com/office/drawing/2014/main" id="{A7208205-03EE-4EC8-9C34-59270C1880D8}"/>
+                <a16:creationId xmlns:a16="http://schemas.microsoft.com/office/drawing/2014/main" xmlns="" id="{A7208205-03EE-4EC8-9C34-59270C1880D8}"/>
               </a:ext>
             </a:extLst>
           </p:cNvPr>
@@ -7008,7 +7003,7 @@
           <p:nvPr>
             <p:extLst>
               <p:ext uri="{386F3935-93C4-4BCD-93E2-E3B085C9AB24}">
-                <p16:designElem xmlns:p16="http://schemas.microsoft.com/office/powerpoint/2015/main" val="1"/>
+                <p16:designElem xmlns:p16="http://schemas.microsoft.com/office/powerpoint/2015/main" xmlns="" val="1"/>
               </p:ext>
             </p:extLst>
           </p:nvPr>
@@ -7223,7 +7218,7 @@
   <p:timing>
     <p:tnLst>
       <p:par>
-        <p:cTn id="1" dur="indefinite" restart="never" nodeType="tmRoot"/>
+        <p:cTn xmlns:p14="http://schemas.microsoft.com/office/powerpoint/2010/main" id="1" dur="indefinite" restart="never" nodeType="tmRoot"/>
       </p:par>
     </p:tnLst>
   </p:timing>
@@ -7275,7 +7270,7 @@
           <p:cNvPr id="8" name="Rounded Rectangle 9">
             <a:extLst>
               <a:ext uri="{FF2B5EF4-FFF2-40B4-BE49-F238E27FC236}">
-                <a16:creationId xmlns="" xmlns:a16="http://schemas.microsoft.com/office/drawing/2014/main" id="{BCA2EB72-13DC-4DC6-B461-3B036C55B925}"/>
+                <a16:creationId xmlns:a16="http://schemas.microsoft.com/office/drawing/2014/main" xmlns="" id="{BCA2EB72-13DC-4DC6-B461-3B036C55B925}"/>
               </a:ext>
             </a:extLst>
           </p:cNvPr>
@@ -7285,7 +7280,7 @@
           <p:nvPr>
             <p:extLst>
               <p:ext uri="{386F3935-93C4-4BCD-93E2-E3B085C9AB24}">
-                <p16:designElem xmlns:p16="http://schemas.microsoft.com/office/powerpoint/2015/main" val="1"/>
+                <p16:designElem xmlns:p16="http://schemas.microsoft.com/office/powerpoint/2015/main" xmlns="" val="1"/>
               </p:ext>
             </p:extLst>
           </p:nvPr>
@@ -7361,7 +7356,7 @@
           <p:cNvPr id="10" name="Straight Connector 9">
             <a:extLst>
               <a:ext uri="{FF2B5EF4-FFF2-40B4-BE49-F238E27FC236}">
-                <a16:creationId xmlns="" xmlns:a16="http://schemas.microsoft.com/office/drawing/2014/main" id="{C8F75BF3-096E-451E-A222-96A7F0946814}"/>
+                <a16:creationId xmlns:a16="http://schemas.microsoft.com/office/drawing/2014/main" xmlns="" id="{C8F75BF3-096E-451E-A222-96A7F0946814}"/>
               </a:ext>
             </a:extLst>
           </p:cNvPr>
@@ -7371,7 +7366,7 @@
           <p:nvPr>
             <p:extLst>
               <p:ext uri="{386F3935-93C4-4BCD-93E2-E3B085C9AB24}">
-                <p16:designElem xmlns:p16="http://schemas.microsoft.com/office/powerpoint/2015/main" val="1"/>
+                <p16:designElem xmlns:p16="http://schemas.microsoft.com/office/powerpoint/2015/main" xmlns="" val="1"/>
               </p:ext>
             </p:extLst>
           </p:nvPr>
@@ -7459,7 +7454,7 @@
   <p:timing>
     <p:tnLst>
       <p:par>
-        <p:cTn id="1" dur="indefinite" restart="never" nodeType="tmRoot"/>
+        <p:cTn xmlns:p14="http://schemas.microsoft.com/office/powerpoint/2010/main" id="1" dur="indefinite" restart="never" nodeType="tmRoot"/>
       </p:par>
     </p:tnLst>
   </p:timing>
@@ -7511,7 +7506,7 @@
           <p:cNvPr id="8" name="Rectangle 7">
             <a:extLst>
               <a:ext uri="{FF2B5EF4-FFF2-40B4-BE49-F238E27FC236}">
-                <a16:creationId xmlns="" xmlns:a16="http://schemas.microsoft.com/office/drawing/2014/main" id="{375136A9-49F9-4DA0-A741-F065B0FA091D}"/>
+                <a16:creationId xmlns:a16="http://schemas.microsoft.com/office/drawing/2014/main" xmlns="" id="{375136A9-49F9-4DA0-A741-F065B0FA091D}"/>
               </a:ext>
             </a:extLst>
           </p:cNvPr>
@@ -7521,7 +7516,7 @@
           <p:nvPr>
             <p:extLst>
               <p:ext uri="{386F3935-93C4-4BCD-93E2-E3B085C9AB24}">
-                <p16:designElem xmlns:p16="http://schemas.microsoft.com/office/powerpoint/2015/main" val="1"/>
+                <p16:designElem xmlns:p16="http://schemas.microsoft.com/office/powerpoint/2015/main" xmlns="" val="1"/>
               </p:ext>
             </p:extLst>
           </p:nvPr>
@@ -7578,7 +7573,7 @@
           <p:cNvPr id="10" name="Rectangle 9">
             <a:extLst>
               <a:ext uri="{FF2B5EF4-FFF2-40B4-BE49-F238E27FC236}">
-                <a16:creationId xmlns="" xmlns:a16="http://schemas.microsoft.com/office/drawing/2014/main" id="{B912F6C7-0423-4B6F-AECE-710C848918FD}"/>
+                <a16:creationId xmlns:a16="http://schemas.microsoft.com/office/drawing/2014/main" xmlns="" id="{B912F6C7-0423-4B6F-AECE-710C848918FD}"/>
               </a:ext>
             </a:extLst>
           </p:cNvPr>
@@ -7588,7 +7583,7 @@
           <p:nvPr>
             <p:extLst>
               <p:ext uri="{386F3935-93C4-4BCD-93E2-E3B085C9AB24}">
-                <p16:designElem xmlns:p16="http://schemas.microsoft.com/office/powerpoint/2015/main" val="1"/>
+                <p16:designElem xmlns:p16="http://schemas.microsoft.com/office/powerpoint/2015/main" xmlns="" val="1"/>
               </p:ext>
             </p:extLst>
           </p:nvPr>
@@ -7656,7 +7651,7 @@
           <p:cNvPr id="12" name="Straight Connector 11">
             <a:extLst>
               <a:ext uri="{FF2B5EF4-FFF2-40B4-BE49-F238E27FC236}">
-                <a16:creationId xmlns="" xmlns:a16="http://schemas.microsoft.com/office/drawing/2014/main" id="{A7208205-03EE-4EC8-9C34-59270C1880D8}"/>
+                <a16:creationId xmlns:a16="http://schemas.microsoft.com/office/drawing/2014/main" xmlns="" id="{A7208205-03EE-4EC8-9C34-59270C1880D8}"/>
               </a:ext>
             </a:extLst>
           </p:cNvPr>
@@ -7666,7 +7661,7 @@
           <p:nvPr>
             <p:extLst>
               <p:ext uri="{386F3935-93C4-4BCD-93E2-E3B085C9AB24}">
-                <p16:designElem xmlns:p16="http://schemas.microsoft.com/office/powerpoint/2015/main" val="1"/>
+                <p16:designElem xmlns:p16="http://schemas.microsoft.com/office/powerpoint/2015/main" xmlns="" val="1"/>
               </p:ext>
             </p:extLst>
           </p:nvPr>
@@ -7835,7 +7830,7 @@
   <p:timing>
     <p:tnLst>
       <p:par>
-        <p:cTn id="1" dur="indefinite" restart="never" nodeType="tmRoot"/>
+        <p:cTn xmlns:p14="http://schemas.microsoft.com/office/powerpoint/2010/main" id="1" dur="indefinite" restart="never" nodeType="tmRoot"/>
       </p:par>
     </p:tnLst>
   </p:timing>
@@ -7887,7 +7882,7 @@
           <p:cNvPr id="8" name="Rounded Rectangle 9">
             <a:extLst>
               <a:ext uri="{FF2B5EF4-FFF2-40B4-BE49-F238E27FC236}">
-                <a16:creationId xmlns="" xmlns:a16="http://schemas.microsoft.com/office/drawing/2014/main" id="{BCA2EB72-13DC-4DC6-B461-3B036C55B925}"/>
+                <a16:creationId xmlns:a16="http://schemas.microsoft.com/office/drawing/2014/main" xmlns="" id="{BCA2EB72-13DC-4DC6-B461-3B036C55B925}"/>
               </a:ext>
             </a:extLst>
           </p:cNvPr>
@@ -7897,7 +7892,7 @@
           <p:nvPr>
             <p:extLst>
               <p:ext uri="{386F3935-93C4-4BCD-93E2-E3B085C9AB24}">
-                <p16:designElem xmlns:p16="http://schemas.microsoft.com/office/powerpoint/2015/main" val="1"/>
+                <p16:designElem xmlns:p16="http://schemas.microsoft.com/office/powerpoint/2015/main" xmlns="" val="1"/>
               </p:ext>
             </p:extLst>
           </p:nvPr>
@@ -7973,7 +7968,7 @@
           <p:cNvPr id="10" name="Straight Connector 9">
             <a:extLst>
               <a:ext uri="{FF2B5EF4-FFF2-40B4-BE49-F238E27FC236}">
-                <a16:creationId xmlns="" xmlns:a16="http://schemas.microsoft.com/office/drawing/2014/main" id="{C8F75BF3-096E-451E-A222-96A7F0946814}"/>
+                <a16:creationId xmlns:a16="http://schemas.microsoft.com/office/drawing/2014/main" xmlns="" id="{C8F75BF3-096E-451E-A222-96A7F0946814}"/>
               </a:ext>
             </a:extLst>
           </p:cNvPr>
@@ -7983,7 +7978,7 @@
           <p:nvPr>
             <p:extLst>
               <p:ext uri="{386F3935-93C4-4BCD-93E2-E3B085C9AB24}">
-                <p16:designElem xmlns:p16="http://schemas.microsoft.com/office/powerpoint/2015/main" val="1"/>
+                <p16:designElem xmlns:p16="http://schemas.microsoft.com/office/powerpoint/2015/main" xmlns="" val="1"/>
               </p:ext>
             </p:extLst>
           </p:nvPr>
@@ -8071,7 +8066,7 @@
   <p:timing>
     <p:tnLst>
       <p:par>
-        <p:cTn id="1" dur="indefinite" restart="never" nodeType="tmRoot"/>
+        <p:cTn xmlns:p14="http://schemas.microsoft.com/office/powerpoint/2010/main" id="1" dur="indefinite" restart="never" nodeType="tmRoot"/>
       </p:par>
     </p:tnLst>
   </p:timing>
@@ -8123,7 +8118,7 @@
           <p:cNvPr id="8" name="Rectangle 7">
             <a:extLst>
               <a:ext uri="{FF2B5EF4-FFF2-40B4-BE49-F238E27FC236}">
-                <a16:creationId xmlns="" xmlns:a16="http://schemas.microsoft.com/office/drawing/2014/main" id="{375136A9-49F9-4DA0-A741-F065B0FA091D}"/>
+                <a16:creationId xmlns:a16="http://schemas.microsoft.com/office/drawing/2014/main" xmlns="" id="{375136A9-49F9-4DA0-A741-F065B0FA091D}"/>
               </a:ext>
             </a:extLst>
           </p:cNvPr>
@@ -8133,7 +8128,7 @@
           <p:nvPr>
             <p:extLst>
               <p:ext uri="{386F3935-93C4-4BCD-93E2-E3B085C9AB24}">
-                <p16:designElem xmlns:p16="http://schemas.microsoft.com/office/powerpoint/2015/main" val="1"/>
+                <p16:designElem xmlns:p16="http://schemas.microsoft.com/office/powerpoint/2015/main" xmlns="" val="1"/>
               </p:ext>
             </p:extLst>
           </p:nvPr>
@@ -8190,7 +8185,7 @@
           <p:cNvPr id="10" name="Rectangle 9">
             <a:extLst>
               <a:ext uri="{FF2B5EF4-FFF2-40B4-BE49-F238E27FC236}">
-                <a16:creationId xmlns="" xmlns:a16="http://schemas.microsoft.com/office/drawing/2014/main" id="{B912F6C7-0423-4B6F-AECE-710C848918FD}"/>
+                <a16:creationId xmlns:a16="http://schemas.microsoft.com/office/drawing/2014/main" xmlns="" id="{B912F6C7-0423-4B6F-AECE-710C848918FD}"/>
               </a:ext>
             </a:extLst>
           </p:cNvPr>
@@ -8200,7 +8195,7 @@
           <p:nvPr>
             <p:extLst>
               <p:ext uri="{386F3935-93C4-4BCD-93E2-E3B085C9AB24}">
-                <p16:designElem xmlns:p16="http://schemas.microsoft.com/office/powerpoint/2015/main" val="1"/>
+                <p16:designElem xmlns:p16="http://schemas.microsoft.com/office/powerpoint/2015/main" xmlns="" val="1"/>
               </p:ext>
             </p:extLst>
           </p:nvPr>
@@ -8268,7 +8263,7 @@
           <p:cNvPr id="12" name="Straight Connector 11">
             <a:extLst>
               <a:ext uri="{FF2B5EF4-FFF2-40B4-BE49-F238E27FC236}">
-                <a16:creationId xmlns="" xmlns:a16="http://schemas.microsoft.com/office/drawing/2014/main" id="{A7208205-03EE-4EC8-9C34-59270C1880D8}"/>
+                <a16:creationId xmlns:a16="http://schemas.microsoft.com/office/drawing/2014/main" xmlns="" id="{A7208205-03EE-4EC8-9C34-59270C1880D8}"/>
               </a:ext>
             </a:extLst>
           </p:cNvPr>
@@ -8278,7 +8273,7 @@
           <p:nvPr>
             <p:extLst>
               <p:ext uri="{386F3935-93C4-4BCD-93E2-E3B085C9AB24}">
-                <p16:designElem xmlns:p16="http://schemas.microsoft.com/office/powerpoint/2015/main" val="1"/>
+                <p16:designElem xmlns:p16="http://schemas.microsoft.com/office/powerpoint/2015/main" xmlns="" val="1"/>
               </p:ext>
             </p:extLst>
           </p:nvPr>
@@ -8510,7 +8505,7 @@
   <p:timing>
     <p:tnLst>
       <p:par>
-        <p:cTn id="1" dur="indefinite" restart="never" nodeType="tmRoot"/>
+        <p:cTn xmlns:p14="http://schemas.microsoft.com/office/powerpoint/2010/main" id="1" dur="indefinite" restart="never" nodeType="tmRoot"/>
       </p:par>
     </p:tnLst>
   </p:timing>
@@ -8562,7 +8557,7 @@
           <p:cNvPr id="8" name="Rounded Rectangle 9">
             <a:extLst>
               <a:ext uri="{FF2B5EF4-FFF2-40B4-BE49-F238E27FC236}">
-                <a16:creationId xmlns="" xmlns:a16="http://schemas.microsoft.com/office/drawing/2014/main" id="{BCA2EB72-13DC-4DC6-B461-3B036C55B925}"/>
+                <a16:creationId xmlns:a16="http://schemas.microsoft.com/office/drawing/2014/main" xmlns="" id="{BCA2EB72-13DC-4DC6-B461-3B036C55B925}"/>
               </a:ext>
             </a:extLst>
           </p:cNvPr>
@@ -8572,7 +8567,7 @@
           <p:nvPr>
             <p:extLst>
               <p:ext uri="{386F3935-93C4-4BCD-93E2-E3B085C9AB24}">
-                <p16:designElem xmlns:p16="http://schemas.microsoft.com/office/powerpoint/2015/main" val="1"/>
+                <p16:designElem xmlns:p16="http://schemas.microsoft.com/office/powerpoint/2015/main" xmlns="" val="1"/>
               </p:ext>
             </p:extLst>
           </p:nvPr>
@@ -8648,7 +8643,7 @@
           <p:cNvPr id="10" name="Straight Connector 9">
             <a:extLst>
               <a:ext uri="{FF2B5EF4-FFF2-40B4-BE49-F238E27FC236}">
-                <a16:creationId xmlns="" xmlns:a16="http://schemas.microsoft.com/office/drawing/2014/main" id="{C8F75BF3-096E-451E-A222-96A7F0946814}"/>
+                <a16:creationId xmlns:a16="http://schemas.microsoft.com/office/drawing/2014/main" xmlns="" id="{C8F75BF3-096E-451E-A222-96A7F0946814}"/>
               </a:ext>
             </a:extLst>
           </p:cNvPr>
@@ -8658,7 +8653,7 @@
           <p:nvPr>
             <p:extLst>
               <p:ext uri="{386F3935-93C4-4BCD-93E2-E3B085C9AB24}">
-                <p16:designElem xmlns:p16="http://schemas.microsoft.com/office/powerpoint/2015/main" val="1"/>
+                <p16:designElem xmlns:p16="http://schemas.microsoft.com/office/powerpoint/2015/main" xmlns="" val="1"/>
               </p:ext>
             </p:extLst>
           </p:nvPr>
@@ -8746,7 +8741,7 @@
   <p:timing>
     <p:tnLst>
       <p:par>
-        <p:cTn id="1" dur="indefinite" restart="never" nodeType="tmRoot"/>
+        <p:cTn xmlns:p14="http://schemas.microsoft.com/office/powerpoint/2010/main" id="1" dur="indefinite" restart="never" nodeType="tmRoot"/>
       </p:par>
     </p:tnLst>
   </p:timing>
@@ -8796,7 +8791,7 @@
     </a:clrScheme>
     <a:fontScheme name="Mesh">
       <a:majorFont>
-        <a:latin typeface="Century Gothic" panose="020B0502020202020204"/>
+        <a:latin typeface="Century Gothic"/>
         <a:ea typeface=""/>
         <a:cs typeface=""/>
         <a:font script="Jpan" typeface="ＭＳ ゴシック"/>
@@ -8831,7 +8826,7 @@
         <a:font script="Geor" typeface="Sylfaen"/>
       </a:majorFont>
       <a:minorFont>
-        <a:latin typeface="Century Gothic" panose="020B0502020202020204"/>
+        <a:latin typeface="Century Gothic"/>
         <a:ea typeface=""/>
         <a:cs typeface=""/>
         <a:font script="Jpan" typeface="ＭＳ ゴシック"/>
@@ -9003,7 +8998,7 @@
   <a:extraClrSchemeLst/>
   <a:extLst>
     <a:ext uri="{05A4C25C-085E-4340-85A3-A5531E510DB2}">
-      <thm15:themeFamily xmlns:thm15="http://schemas.microsoft.com/office/thememl/2012/main" name="Mesh" id="{789EC3FE-34FD-429C-9918-760025E6C145}" vid="{B8BE45C0-8141-4D58-8C71-A009BC26FBBB}"/>
+      <thm15:themeFamily xmlns:thm15="http://schemas.microsoft.com/office/thememl/2012/main" xmlns="" name="Mesh" id="{789EC3FE-34FD-429C-9918-760025E6C145}" vid="{B8BE45C0-8141-4D58-8C71-A009BC26FBBB}"/>
     </a:ext>
   </a:extLst>
 </a:theme>
@@ -9052,7 +9047,7 @@
     </a:clrScheme>
     <a:fontScheme name="Office">
       <a:majorFont>
-        <a:latin typeface="Calibri Light" panose="020F0302020204030204"/>
+        <a:latin typeface="Calibri Light"/>
         <a:ea typeface=""/>
         <a:cs typeface=""/>
         <a:font script="Jpan" typeface="Yu Gothic Light"/>
@@ -9087,7 +9082,7 @@
         <a:font script="Geor" typeface="Sylfaen"/>
       </a:majorFont>
       <a:minorFont>
-        <a:latin typeface="Calibri" panose="020F0502020204030204"/>
+        <a:latin typeface="Calibri"/>
         <a:ea typeface=""/>
         <a:cs typeface=""/>
         <a:font script="Jpan" typeface="Yu Gothic"/>
@@ -9264,7 +9259,7 @@
   <a:extraClrSchemeLst/>
   <a:extLst>
     <a:ext uri="{05A4C25C-085E-4340-85A3-A5531E510DB2}">
-      <thm15:themeFamily xmlns:thm15="http://schemas.microsoft.com/office/thememl/2012/main" name="Office Theme" id="{62F939B6-93AF-4DB8-9C6B-D6C7DFDC589F}" vid="{4A3C46E8-61CC-4603-A589-7422A47A8E4A}"/>
+      <thm15:themeFamily xmlns:thm15="http://schemas.microsoft.com/office/thememl/2012/main" xmlns="" name="Office Theme" id="{62F939B6-93AF-4DB8-9C6B-D6C7DFDC589F}" vid="{4A3C46E8-61CC-4603-A589-7422A47A8E4A}"/>
     </a:ext>
   </a:extLst>
 </a:theme>

</xml_diff>